<commit_message>
fits samples fo pyraf
</commit_message>
<xml_diff>
--- a/Pyraf/Pyraf.pptx
+++ b/Pyraf/Pyraf.pptx
@@ -5153,11 +5153,7 @@
             </a:r>
             <a:r>
               <a:rPr lang="en-US" dirty="0" smtClean="0"/>
-              <a:t> - </a:t>
-            </a:r>
-            <a:r>
-              <a:rPr lang="en-US" dirty="0" smtClean="0"/>
-              <a:t>a better interface wrapping IRAF into python</a:t>
+              <a:t> - a better interface wrapping IRAF into python</a:t>
             </a:r>
             <a:endParaRPr lang="en-US" dirty="0"/>
           </a:p>
@@ -5810,11 +5806,7 @@
           <a:p>
             <a:r>
               <a:rPr lang="en-US" dirty="0" smtClean="0"/>
-              <a:t>--&gt; </a:t>
-            </a:r>
-            <a:r>
-              <a:rPr lang="en-US" dirty="0" smtClean="0"/>
-              <a:t>_</a:t>
+              <a:t>--&gt; _</a:t>
             </a:r>
             <a:r>
               <a:rPr lang="en-US" dirty="0" err="1" smtClean="0"/>
@@ -5901,17 +5893,8 @@
               <a:rPr lang="en-US" dirty="0" smtClean="0">
                 <a:cs typeface="Courier New" panose="02070309020205020404" pitchFamily="49" charset="0"/>
               </a:rPr>
-              <a:t> cl becomes the python interpreter, still taking the package commands and </a:t>
-            </a:r>
-            <a:r>
-              <a:rPr lang="en-US" dirty="0" smtClean="0">
-                <a:cs typeface="Courier New" panose="02070309020205020404" pitchFamily="49" charset="0"/>
-              </a:rPr>
-              <a:t>tasks the same usual way</a:t>
-            </a:r>
-            <a:endParaRPr lang="en-US" dirty="0" smtClean="0">
-              <a:cs typeface="Courier New" panose="02070309020205020404" pitchFamily="49" charset="0"/>
-            </a:endParaRPr>
+              <a:t> cl becomes the python interpreter, still taking the package commands and tasks the same usual way</a:t>
+            </a:r>
           </a:p>
           <a:p>
             <a:r>
@@ -6369,11 +6352,7 @@
             </a:r>
             <a:r>
               <a:rPr lang="en-US" dirty="0" smtClean="0"/>
-              <a:t> = </a:t>
-            </a:r>
-            <a:r>
-              <a:rPr lang="en-US" dirty="0" smtClean="0"/>
-              <a:t>False</a:t>
+              <a:t> = False</a:t>
             </a:r>
           </a:p>
           <a:p>
@@ -6594,9 +6573,6 @@
               </a:rPr>
               <a:t>To exit, we use another syntax too</a:t>
             </a:r>
-            <a:endParaRPr lang="en-US" dirty="0" smtClean="0">
-              <a:cs typeface="Courier New" panose="02070309020205020404" pitchFamily="49" charset="0"/>
-            </a:endParaRPr>
           </a:p>
         </p:txBody>
       </p:sp>
@@ -7182,7 +7158,7 @@
             </a:r>
             <a:r>
               <a:rPr lang="en-US" dirty="0" err="1" smtClean="0"/>
-              <a:t>inputspec.fits</a:t>
+              <a:t>sample.fits</a:t>
             </a:r>
             <a:r>
               <a:rPr lang="en-US" dirty="0" smtClean="0"/>
@@ -7194,11 +7170,19 @@
             </a:r>
             <a:r>
               <a:rPr lang="en-US" dirty="0" smtClean="0"/>
-              <a:t> = ‘</a:t>
+              <a:t> = </a:t>
+            </a:r>
+            <a:r>
+              <a:rPr lang="en-US" dirty="0" smtClean="0"/>
+              <a:t>‘</a:t>
             </a:r>
             <a:r>
               <a:rPr lang="en-US" dirty="0" err="1" smtClean="0"/>
-              <a:t>sun_temp.fits</a:t>
+              <a:t>solar</a:t>
+            </a:r>
+            <a:r>
+              <a:rPr lang="en-US" dirty="0" err="1" smtClean="0"/>
+              <a:t>_temp.fits</a:t>
             </a:r>
             <a:r>
               <a:rPr lang="en-US" dirty="0" smtClean="0"/>

</xml_diff>